<commit_message>
cleaned up some whitespace
</commit_message>
<xml_diff>
--- a/misc/csharp-design-patterns-facade-m1.pptx
+++ b/misc/csharp-design-patterns-facade-m1.pptx
@@ -212,7 +212,6 @@
 <p1510:revInfo xmlns:a="http://schemas.openxmlformats.org/drawingml/2006/main" xmlns:r="http://schemas.openxmlformats.org/officeDocument/2006/relationships" xmlns:p1510="http://schemas.microsoft.com/office/powerpoint/2015/10/main">
   <p1510:revLst>
     <p1510:client id="{39FDA6AC-686C-3A4E-9CFD-DE74618D7D4A}" v="116" dt="2019-11-10T17:01:39.526"/>
-    <p1510:client id="{630CC462-4FF0-4412-AFAF-9829A55D816A}" v="11" dt="2019-11-10T01:22:27.680"/>
   </p1510:revLst>
 </p1510:revInfo>
 </file>
@@ -315,7 +314,7 @@
   <pc:docChgLst>
     <pc:chgData name="David Starr" userId="e49286a23fe22b14" providerId="LiveId" clId="{39FDA6AC-686C-3A4E-9CFD-DE74618D7D4A}"/>
     <pc:docChg chg="undo custSel addSld delSld modSld sldOrd delSection modSection">
-      <pc:chgData name="David Starr" userId="e49286a23fe22b14" providerId="LiveId" clId="{39FDA6AC-686C-3A4E-9CFD-DE74618D7D4A}" dt="2019-11-10T17:01:39.525" v="5773" actId="20577"/>
+      <pc:chgData name="David Starr" userId="e49286a23fe22b14" providerId="LiveId" clId="{39FDA6AC-686C-3A4E-9CFD-DE74618D7D4A}" dt="2019-11-16T20:13:19.413" v="5780" actId="20577"/>
       <pc:docMkLst>
         <pc:docMk/>
       </pc:docMkLst>
@@ -594,12 +593,20 @@
           </ac:cxnSpMkLst>
         </pc:cxnChg>
       </pc:sldChg>
-      <pc:sldChg chg="add ord">
-        <pc:chgData name="David Starr" userId="e49286a23fe22b14" providerId="LiveId" clId="{39FDA6AC-686C-3A4E-9CFD-DE74618D7D4A}" dt="2019-11-10T13:30:31.274" v="5491"/>
+      <pc:sldChg chg="modSp add ord">
+        <pc:chgData name="David Starr" userId="e49286a23fe22b14" providerId="LiveId" clId="{39FDA6AC-686C-3A4E-9CFD-DE74618D7D4A}" dt="2019-11-16T20:13:19.413" v="5780" actId="20577"/>
         <pc:sldMkLst>
           <pc:docMk/>
           <pc:sldMk cId="3750771992" sldId="277"/>
         </pc:sldMkLst>
+        <pc:spChg chg="mod">
+          <ac:chgData name="David Starr" userId="e49286a23fe22b14" providerId="LiveId" clId="{39FDA6AC-686C-3A4E-9CFD-DE74618D7D4A}" dt="2019-11-16T20:13:19.413" v="5780" actId="20577"/>
+          <ac:spMkLst>
+            <pc:docMk/>
+            <pc:sldMk cId="3750771992" sldId="277"/>
+            <ac:spMk id="4" creationId="{99B5D318-1C94-A04E-AC28-CA95E2B4B958}"/>
+          </ac:spMkLst>
+        </pc:spChg>
       </pc:sldChg>
     </pc:docChg>
   </pc:docChgLst>
@@ -688,7 +695,7 @@
           <a:p>
             <a:fld id="{BE1B5227-671A-4331-BA8E-6A194D65408B}" type="datetimeFigureOut">
               <a:rPr lang="en-US" smtClean="0"/>
-              <a:t>11/10/19</a:t>
+              <a:t>11/16/19</a:t>
             </a:fld>
             <a:endParaRPr lang="en-US"/>
           </a:p>
@@ -853,7 +860,7 @@
           <a:p>
             <a:fld id="{27872E6B-C85C-424E-AD51-4389090A2C7D}" type="datetimeFigureOut">
               <a:rPr lang="en-US" smtClean="0"/>
-              <a:t>11/10/19</a:t>
+              <a:t>11/16/19</a:t>
             </a:fld>
             <a:endParaRPr lang="en-US"/>
           </a:p>
@@ -28319,8 +28326,12 @@
           </a:p>
           <a:p>
             <a:r>
-              <a:rPr lang="en-US" dirty="0"/>
-              <a:t>See it in real code</a:t>
+              <a:rPr lang="en-US"/>
+              <a:t>See working </a:t>
+            </a:r>
+            <a:r>
+              <a:rPr lang="en-US" dirty="0"/>
+              <a:t>code</a:t>
             </a:r>
           </a:p>
         </p:txBody>

</xml_diff>